<commit_message>
updated ppt slide and word doc, column width
</commit_message>
<xml_diff>
--- a/ppt_slide.pptx
+++ b/ppt_slide.pptx
@@ -2231,16 +2231,16 @@
             <a:tbl>
               <a:tblPr/>
               <a:tblGrid>
-                <a:gridCol w="2474381"/>
-                <a:gridCol w="1175731"/>
-                <a:gridCol w="434443"/>
-                <a:gridCol w="1408647"/>
-                <a:gridCol w="434443"/>
-                <a:gridCol w="1994534"/>
-                <a:gridCol w="434443"/>
-                <a:gridCol w="441513"/>
+                <a:gridCol w="2057400"/>
+                <a:gridCol w="685800"/>
+                <a:gridCol w="685800"/>
+                <a:gridCol w="685800"/>
+                <a:gridCol w="685800"/>
+                <a:gridCol w="685800"/>
+                <a:gridCol w="685800"/>
+                <a:gridCol w="685800"/>
               </a:tblGrid>
-              <a:tr h="278434">
+              <a:tr h="548640">
                 <a:tc rowSpan="3">
                   <a:txBody>
                     <a:bodyPr/>
@@ -2256,7 +2256,7 @@
                         <a:buNone/>
                       </a:pPr>
                       <a:r>
-                        <a:rPr sz="1000">
+                        <a:rPr sz="1400">
                           <a:solidFill>
                             <a:srgbClr val="000000">
                               <a:alpha val="100000"/>
@@ -2311,7 +2311,7 @@
                         <a:buNone/>
                       </a:pPr>
                       <a:r>
-                        <a:rPr sz="1000">
+                        <a:rPr sz="1400">
                           <a:solidFill>
                             <a:srgbClr val="000000">
                               <a:alpha val="100000"/>
@@ -2366,7 +2366,7 @@
                         <a:buNone/>
                       </a:pPr>
                       <a:r>
-                        <a:rPr sz="1000">
+                        <a:rPr sz="1400">
                           <a:solidFill>
                             <a:srgbClr val="000000">
                               <a:alpha val="100000"/>
@@ -2421,7 +2421,7 @@
                         <a:buNone/>
                       </a:pPr>
                       <a:r>
-                        <a:rPr sz="1000">
+                        <a:rPr sz="1400">
                           <a:solidFill>
                             <a:srgbClr val="000000">
                               <a:alpha val="100000"/>
@@ -2476,7 +2476,7 @@
                         <a:buNone/>
                       </a:pPr>
                       <a:r>
-                        <a:rPr sz="1000">
+                        <a:rPr sz="1400">
                           <a:solidFill>
                             <a:srgbClr val="000000">
                               <a:alpha val="100000"/>
@@ -2531,7 +2531,7 @@
                         <a:buNone/>
                       </a:pPr>
                       <a:r>
-                        <a:rPr sz="1000">
+                        <a:rPr sz="1400">
                           <a:solidFill>
                             <a:srgbClr val="000000">
                               <a:alpha val="100000"/>
@@ -2586,7 +2586,7 @@
                         <a:buNone/>
                       </a:pPr>
                       <a:r>
-                        <a:rPr sz="1000">
+                        <a:rPr sz="1400">
                           <a:solidFill>
                             <a:srgbClr val="000000">
                               <a:alpha val="100000"/>
@@ -2641,7 +2641,7 @@
                         <a:buNone/>
                       </a:pPr>
                       <a:r>
-                        <a:rPr sz="1000">
+                        <a:rPr sz="1400">
                           <a:solidFill>
                             <a:srgbClr val="000000">
                               <a:alpha val="100000"/>
@@ -2682,7 +2682,7 @@
                   </a:tcPr>
                 </a:tc>
               </a:tr>
-              <a:tr h="278434">
+              <a:tr h="548640">
                 <a:tc vMerge="true">
                   <a:txBody>
                     <a:bodyPr/>
@@ -2698,7 +2698,7 @@
                         <a:buNone/>
                       </a:pPr>
                       <a:r>
-                        <a:rPr sz="1000">
+                        <a:rPr sz="1400">
                           <a:solidFill>
                             <a:srgbClr val="000000">
                               <a:alpha val="100000"/>
@@ -2753,7 +2753,7 @@
                         <a:buNone/>
                       </a:pPr>
                       <a:r>
-                        <a:rPr sz="1000">
+                        <a:rPr sz="1400">
                           <a:solidFill>
                             <a:srgbClr val="000000">
                               <a:alpha val="100000"/>
@@ -2808,7 +2808,7 @@
                         <a:buNone/>
                       </a:pPr>
                       <a:r>
-                        <a:rPr sz="1000">
+                        <a:rPr sz="1400">
                           <a:solidFill>
                             <a:srgbClr val="000000">
                               <a:alpha val="100000"/>
@@ -2863,7 +2863,7 @@
                         <a:buNone/>
                       </a:pPr>
                       <a:r>
-                        <a:rPr sz="1000">
+                        <a:rPr sz="1400">
                           <a:solidFill>
                             <a:srgbClr val="000000">
                               <a:alpha val="100000"/>
@@ -2918,7 +2918,7 @@
                         <a:buNone/>
                       </a:pPr>
                       <a:r>
-                        <a:rPr sz="1000">
+                        <a:rPr sz="1400">
                           <a:solidFill>
                             <a:srgbClr val="000000">
                               <a:alpha val="100000"/>
@@ -2973,16 +2973,16 @@
                         <a:buNone/>
                       </a:pPr>
                       <a:r>
-                        <a:rPr sz="1000">
-                          <a:solidFill>
-                            <a:srgbClr val="000000">
-                              <a:alpha val="100000"/>
-                            </a:srgbClr>
-                          </a:solidFill>
-                          <a:latin typeface="Arial"/>
-                          <a:cs typeface="Arial"/>
-                        </a:rPr>
-                        <a:t>Unknown/Not Reported Ethnicity</a:t>
+                        <a:rPr sz="1400">
+                          <a:solidFill>
+                            <a:srgbClr val="000000">
+                              <a:alpha val="100000"/>
+                            </a:srgbClr>
+                          </a:solidFill>
+                          <a:latin typeface="Arial"/>
+                          <a:cs typeface="Arial"/>
+                        </a:rPr>
+                        <a:t>Unknown/Not Reported</a:t>
                       </a:r>
                     </a:p>
                   </a:txBody>
@@ -3028,16 +3028,16 @@
                         <a:buNone/>
                       </a:pPr>
                       <a:r>
-                        <a:rPr sz="1000">
-                          <a:solidFill>
-                            <a:srgbClr val="000000">
-                              <a:alpha val="100000"/>
-                            </a:srgbClr>
-                          </a:solidFill>
-                          <a:latin typeface="Arial"/>
-                          <a:cs typeface="Arial"/>
-                        </a:rPr>
-                        <a:t>Unknown/Not Reported Ethnicity</a:t>
+                        <a:rPr sz="1400">
+                          <a:solidFill>
+                            <a:srgbClr val="000000">
+                              <a:alpha val="100000"/>
+                            </a:srgbClr>
+                          </a:solidFill>
+                          <a:latin typeface="Arial"/>
+                          <a:cs typeface="Arial"/>
+                        </a:rPr>
+                        <a:t>Unknown/Not Reported</a:t>
                       </a:r>
                     </a:p>
                   </a:txBody>
@@ -3083,7 +3083,7 @@
                         <a:buNone/>
                       </a:pPr>
                       <a:r>
-                        <a:rPr sz="1000">
+                        <a:rPr sz="1400">
                           <a:solidFill>
                             <a:srgbClr val="000000">
                               <a:alpha val="100000"/>
@@ -3124,7 +3124,7 @@
                   </a:tcPr>
                 </a:tc>
               </a:tr>
-              <a:tr h="251645">
+              <a:tr h="228600">
                 <a:tc vMerge="true">
                   <a:txBody>
                     <a:bodyPr/>
@@ -3140,7 +3140,7 @@
                         <a:buNone/>
                       </a:pPr>
                       <a:r>
-                        <a:rPr sz="1000">
+                        <a:rPr sz="1400">
                           <a:solidFill>
                             <a:srgbClr val="000000">
                               <a:alpha val="100000"/>
@@ -3195,7 +3195,7 @@
                         <a:buNone/>
                       </a:pPr>
                       <a:r>
-                        <a:rPr sz="1000">
+                        <a:rPr sz="1400">
                           <a:solidFill>
                             <a:srgbClr val="000000">
                               <a:alpha val="100000"/>
@@ -3250,7 +3250,7 @@
                         <a:buNone/>
                       </a:pPr>
                       <a:r>
-                        <a:rPr sz="1000">
+                        <a:rPr sz="1400">
                           <a:solidFill>
                             <a:srgbClr val="000000">
                               <a:alpha val="100000"/>
@@ -3305,7 +3305,7 @@
                         <a:buNone/>
                       </a:pPr>
                       <a:r>
-                        <a:rPr sz="1000">
+                        <a:rPr sz="1400">
                           <a:solidFill>
                             <a:srgbClr val="000000">
                               <a:alpha val="100000"/>
@@ -3360,7 +3360,7 @@
                         <a:buNone/>
                       </a:pPr>
                       <a:r>
-                        <a:rPr sz="1000">
+                        <a:rPr sz="1400">
                           <a:solidFill>
                             <a:srgbClr val="000000">
                               <a:alpha val="100000"/>
@@ -3415,7 +3415,7 @@
                         <a:buNone/>
                       </a:pPr>
                       <a:r>
-                        <a:rPr sz="1000">
+                        <a:rPr sz="1400">
                           <a:solidFill>
                             <a:srgbClr val="000000">
                               <a:alpha val="100000"/>
@@ -3470,7 +3470,7 @@
                         <a:buNone/>
                       </a:pPr>
                       <a:r>
-                        <a:rPr sz="1000">
+                        <a:rPr sz="1400">
                           <a:solidFill>
                             <a:srgbClr val="000000">
                               <a:alpha val="100000"/>
@@ -3525,7 +3525,7 @@
                         <a:buNone/>
                       </a:pPr>
                       <a:r>
-                        <a:rPr sz="1000">
+                        <a:rPr sz="1400">
                           <a:solidFill>
                             <a:srgbClr val="000000">
                               <a:alpha val="100000"/>
@@ -3566,7 +3566,7 @@
                   </a:tcPr>
                 </a:tc>
               </a:tr>
-              <a:tr h="252042">
+              <a:tr h="228600">
                 <a:tc>
                   <a:txBody>
                     <a:bodyPr/>
@@ -3582,7 +3582,7 @@
                         <a:buNone/>
                       </a:pPr>
                       <a:r>
-                        <a:rPr sz="1000">
+                        <a:rPr sz="1200">
                           <a:solidFill>
                             <a:srgbClr val="000000">
                               <a:alpha val="100000"/>
@@ -3633,7 +3633,7 @@
                         <a:buNone/>
                       </a:pPr>
                       <a:r>
-                        <a:rPr sz="1000">
+                        <a:rPr sz="1200">
                           <a:solidFill>
                             <a:srgbClr val="000000">
                               <a:alpha val="100000"/>
@@ -3684,7 +3684,7 @@
                         <a:buNone/>
                       </a:pPr>
                       <a:r>
-                        <a:rPr sz="1000">
+                        <a:rPr sz="1200">
                           <a:solidFill>
                             <a:srgbClr val="000000">
                               <a:alpha val="100000"/>
@@ -3735,7 +3735,7 @@
                         <a:buNone/>
                       </a:pPr>
                       <a:r>
-                        <a:rPr sz="1000">
+                        <a:rPr sz="1200">
                           <a:solidFill>
                             <a:srgbClr val="000000">
                               <a:alpha val="100000"/>
@@ -3786,7 +3786,7 @@
                         <a:buNone/>
                       </a:pPr>
                       <a:r>
-                        <a:rPr sz="1000">
+                        <a:rPr sz="1200">
                           <a:solidFill>
                             <a:srgbClr val="000000">
                               <a:alpha val="100000"/>
@@ -3837,7 +3837,7 @@
                         <a:buNone/>
                       </a:pPr>
                       <a:r>
-                        <a:rPr sz="1000">
+                        <a:rPr sz="1200">
                           <a:solidFill>
                             <a:srgbClr val="000000">
                               <a:alpha val="100000"/>
@@ -3888,7 +3888,7 @@
                         <a:buNone/>
                       </a:pPr>
                       <a:r>
-                        <a:rPr sz="1000">
+                        <a:rPr sz="1200">
                           <a:solidFill>
                             <a:srgbClr val="000000">
                               <a:alpha val="100000"/>
@@ -3939,7 +3939,7 @@
                         <a:buNone/>
                       </a:pPr>
                       <a:r>
-                        <a:rPr sz="1000">
+                        <a:rPr sz="1200">
                           <a:solidFill>
                             <a:srgbClr val="000000">
                               <a:alpha val="100000"/>
@@ -3976,7 +3976,7 @@
                   </a:tcPr>
                 </a:tc>
               </a:tr>
-              <a:tr h="252042">
+              <a:tr h="228600">
                 <a:tc>
                   <a:txBody>
                     <a:bodyPr/>
@@ -3992,7 +3992,7 @@
                         <a:buNone/>
                       </a:pPr>
                       <a:r>
-                        <a:rPr sz="1000">
+                        <a:rPr sz="1200">
                           <a:solidFill>
                             <a:srgbClr val="000000">
                               <a:alpha val="100000"/>
@@ -4047,7 +4047,7 @@
                         <a:buNone/>
                       </a:pPr>
                       <a:r>
-                        <a:rPr sz="1000">
+                        <a:rPr sz="1200">
                           <a:solidFill>
                             <a:srgbClr val="000000">
                               <a:alpha val="100000"/>
@@ -4102,7 +4102,7 @@
                         <a:buNone/>
                       </a:pPr>
                       <a:r>
-                        <a:rPr sz="1000">
+                        <a:rPr sz="1200">
                           <a:solidFill>
                             <a:srgbClr val="000000">
                               <a:alpha val="100000"/>
@@ -4157,7 +4157,7 @@
                         <a:buNone/>
                       </a:pPr>
                       <a:r>
-                        <a:rPr sz="1000">
+                        <a:rPr sz="1200">
                           <a:solidFill>
                             <a:srgbClr val="000000">
                               <a:alpha val="100000"/>
@@ -4212,7 +4212,7 @@
                         <a:buNone/>
                       </a:pPr>
                       <a:r>
-                        <a:rPr sz="1000">
+                        <a:rPr sz="1200">
                           <a:solidFill>
                             <a:srgbClr val="000000">
                               <a:alpha val="100000"/>
@@ -4267,7 +4267,7 @@
                         <a:buNone/>
                       </a:pPr>
                       <a:r>
-                        <a:rPr sz="1000">
+                        <a:rPr sz="1200">
                           <a:solidFill>
                             <a:srgbClr val="000000">
                               <a:alpha val="100000"/>
@@ -4322,7 +4322,7 @@
                         <a:buNone/>
                       </a:pPr>
                       <a:r>
-                        <a:rPr sz="1000">
+                        <a:rPr sz="1200">
                           <a:solidFill>
                             <a:srgbClr val="000000">
                               <a:alpha val="100000"/>
@@ -4377,7 +4377,7 @@
                         <a:buNone/>
                       </a:pPr>
                       <a:r>
-                        <a:rPr sz="1000">
+                        <a:rPr sz="1200">
                           <a:solidFill>
                             <a:srgbClr val="000000">
                               <a:alpha val="100000"/>
@@ -4418,7 +4418,7 @@
                   </a:tcPr>
                 </a:tc>
               </a:tr>
-              <a:tr h="253233">
+              <a:tr h="228600">
                 <a:tc>
                   <a:txBody>
                     <a:bodyPr/>
@@ -4434,7 +4434,7 @@
                         <a:buNone/>
                       </a:pPr>
                       <a:r>
-                        <a:rPr sz="1000">
+                        <a:rPr sz="1200">
                           <a:solidFill>
                             <a:srgbClr val="000000">
                               <a:alpha val="100000"/>
@@ -4489,7 +4489,7 @@
                         <a:buNone/>
                       </a:pPr>
                       <a:r>
-                        <a:rPr sz="1000">
+                        <a:rPr sz="1200">
                           <a:solidFill>
                             <a:srgbClr val="000000">
                               <a:alpha val="100000"/>
@@ -4544,7 +4544,7 @@
                         <a:buNone/>
                       </a:pPr>
                       <a:r>
-                        <a:rPr sz="1000">
+                        <a:rPr sz="1200">
                           <a:solidFill>
                             <a:srgbClr val="000000">
                               <a:alpha val="100000"/>
@@ -4599,7 +4599,7 @@
                         <a:buNone/>
                       </a:pPr>
                       <a:r>
-                        <a:rPr sz="1000">
+                        <a:rPr sz="1200">
                           <a:solidFill>
                             <a:srgbClr val="000000">
                               <a:alpha val="100000"/>
@@ -4654,7 +4654,7 @@
                         <a:buNone/>
                       </a:pPr>
                       <a:r>
-                        <a:rPr sz="1000">
+                        <a:rPr sz="1200">
                           <a:solidFill>
                             <a:srgbClr val="000000">
                               <a:alpha val="100000"/>
@@ -4709,7 +4709,7 @@
                         <a:buNone/>
                       </a:pPr>
                       <a:r>
-                        <a:rPr sz="1000">
+                        <a:rPr sz="1200">
                           <a:solidFill>
                             <a:srgbClr val="000000">
                               <a:alpha val="100000"/>
@@ -4764,7 +4764,7 @@
                         <a:buNone/>
                       </a:pPr>
                       <a:r>
-                        <a:rPr sz="1000">
+                        <a:rPr sz="1200">
                           <a:solidFill>
                             <a:srgbClr val="000000">
                               <a:alpha val="100000"/>
@@ -4819,7 +4819,7 @@
                         <a:buNone/>
                       </a:pPr>
                       <a:r>
-                        <a:rPr sz="1000">
+                        <a:rPr sz="1200">
                           <a:solidFill>
                             <a:srgbClr val="000000">
                               <a:alpha val="100000"/>
@@ -4860,7 +4860,7 @@
                   </a:tcPr>
                 </a:tc>
               </a:tr>
-              <a:tr h="253233">
+              <a:tr h="228600">
                 <a:tc>
                   <a:txBody>
                     <a:bodyPr/>
@@ -4876,7 +4876,7 @@
                         <a:buNone/>
                       </a:pPr>
                       <a:r>
-                        <a:rPr sz="1000">
+                        <a:rPr sz="1200">
                           <a:solidFill>
                             <a:srgbClr val="000000">
                               <a:alpha val="100000"/>
@@ -4931,7 +4931,7 @@
                         <a:buNone/>
                       </a:pPr>
                       <a:r>
-                        <a:rPr sz="1000">
+                        <a:rPr sz="1200">
                           <a:solidFill>
                             <a:srgbClr val="000000">
                               <a:alpha val="100000"/>
@@ -4986,7 +4986,7 @@
                         <a:buNone/>
                       </a:pPr>
                       <a:r>
-                        <a:rPr sz="1000">
+                        <a:rPr sz="1200">
                           <a:solidFill>
                             <a:srgbClr val="000000">
                               <a:alpha val="100000"/>
@@ -5041,7 +5041,7 @@
                         <a:buNone/>
                       </a:pPr>
                       <a:r>
-                        <a:rPr sz="1000">
+                        <a:rPr sz="1200">
                           <a:solidFill>
                             <a:srgbClr val="000000">
                               <a:alpha val="100000"/>
@@ -5096,7 +5096,7 @@
                         <a:buNone/>
                       </a:pPr>
                       <a:r>
-                        <a:rPr sz="1000">
+                        <a:rPr sz="1200">
                           <a:solidFill>
                             <a:srgbClr val="000000">
                               <a:alpha val="100000"/>
@@ -5151,7 +5151,7 @@
                         <a:buNone/>
                       </a:pPr>
                       <a:r>
-                        <a:rPr sz="1000">
+                        <a:rPr sz="1200">
                           <a:solidFill>
                             <a:srgbClr val="000000">
                               <a:alpha val="100000"/>
@@ -5206,7 +5206,7 @@
                         <a:buNone/>
                       </a:pPr>
                       <a:r>
-                        <a:rPr sz="1000">
+                        <a:rPr sz="1200">
                           <a:solidFill>
                             <a:srgbClr val="000000">
                               <a:alpha val="100000"/>
@@ -5261,7 +5261,7 @@
                         <a:buNone/>
                       </a:pPr>
                       <a:r>
-                        <a:rPr sz="1000">
+                        <a:rPr sz="1200">
                           <a:solidFill>
                             <a:srgbClr val="000000">
                               <a:alpha val="100000"/>
@@ -5302,7 +5302,7 @@
                   </a:tcPr>
                 </a:tc>
               </a:tr>
-              <a:tr h="253233">
+              <a:tr h="228600">
                 <a:tc>
                   <a:txBody>
                     <a:bodyPr/>
@@ -5318,7 +5318,7 @@
                         <a:buNone/>
                       </a:pPr>
                       <a:r>
-                        <a:rPr sz="1000">
+                        <a:rPr sz="1200">
                           <a:solidFill>
                             <a:srgbClr val="000000">
                               <a:alpha val="100000"/>
@@ -5373,7 +5373,7 @@
                         <a:buNone/>
                       </a:pPr>
                       <a:r>
-                        <a:rPr sz="1000">
+                        <a:rPr sz="1200">
                           <a:solidFill>
                             <a:srgbClr val="000000">
                               <a:alpha val="100000"/>
@@ -5428,7 +5428,7 @@
                         <a:buNone/>
                       </a:pPr>
                       <a:r>
-                        <a:rPr sz="1000">
+                        <a:rPr sz="1200">
                           <a:solidFill>
                             <a:srgbClr val="000000">
                               <a:alpha val="100000"/>
@@ -5483,7 +5483,7 @@
                         <a:buNone/>
                       </a:pPr>
                       <a:r>
-                        <a:rPr sz="1000">
+                        <a:rPr sz="1200">
                           <a:solidFill>
                             <a:srgbClr val="000000">
                               <a:alpha val="100000"/>
@@ -5538,7 +5538,7 @@
                         <a:buNone/>
                       </a:pPr>
                       <a:r>
-                        <a:rPr sz="1000">
+                        <a:rPr sz="1200">
                           <a:solidFill>
                             <a:srgbClr val="000000">
                               <a:alpha val="100000"/>
@@ -5593,7 +5593,7 @@
                         <a:buNone/>
                       </a:pPr>
                       <a:r>
-                        <a:rPr sz="1000">
+                        <a:rPr sz="1200">
                           <a:solidFill>
                             <a:srgbClr val="000000">
                               <a:alpha val="100000"/>
@@ -5648,7 +5648,7 @@
                         <a:buNone/>
                       </a:pPr>
                       <a:r>
-                        <a:rPr sz="1000">
+                        <a:rPr sz="1200">
                           <a:solidFill>
                             <a:srgbClr val="000000">
                               <a:alpha val="100000"/>
@@ -5703,7 +5703,7 @@
                         <a:buNone/>
                       </a:pPr>
                       <a:r>
-                        <a:rPr sz="1000">
+                        <a:rPr sz="1200">
                           <a:solidFill>
                             <a:srgbClr val="000000">
                               <a:alpha val="100000"/>
@@ -5744,7 +5744,7 @@
                   </a:tcPr>
                 </a:tc>
               </a:tr>
-              <a:tr h="275259">
+              <a:tr h="228600">
                 <a:tc>
                   <a:txBody>
                     <a:bodyPr/>
@@ -5760,7 +5760,7 @@
                         <a:buNone/>
                       </a:pPr>
                       <a:r>
-                        <a:rPr sz="1000">
+                        <a:rPr sz="1200">
                           <a:solidFill>
                             <a:srgbClr val="000000">
                               <a:alpha val="100000"/>
@@ -5815,7 +5815,7 @@
                         <a:buNone/>
                       </a:pPr>
                       <a:r>
-                        <a:rPr sz="1000">
+                        <a:rPr sz="1200">
                           <a:solidFill>
                             <a:srgbClr val="000000">
                               <a:alpha val="100000"/>
@@ -5870,7 +5870,7 @@
                         <a:buNone/>
                       </a:pPr>
                       <a:r>
-                        <a:rPr sz="1000">
+                        <a:rPr sz="1200">
                           <a:solidFill>
                             <a:srgbClr val="000000">
                               <a:alpha val="100000"/>
@@ -5925,7 +5925,7 @@
                         <a:buNone/>
                       </a:pPr>
                       <a:r>
-                        <a:rPr sz="1000">
+                        <a:rPr sz="1200">
                           <a:solidFill>
                             <a:srgbClr val="000000">
                               <a:alpha val="100000"/>
@@ -5980,7 +5980,7 @@
                         <a:buNone/>
                       </a:pPr>
                       <a:r>
-                        <a:rPr sz="1000">
+                        <a:rPr sz="1200">
                           <a:solidFill>
                             <a:srgbClr val="000000">
                               <a:alpha val="100000"/>
@@ -6035,7 +6035,7 @@
                         <a:buNone/>
                       </a:pPr>
                       <a:r>
-                        <a:rPr sz="1000">
+                        <a:rPr sz="1200">
                           <a:solidFill>
                             <a:srgbClr val="000000">
                               <a:alpha val="100000"/>
@@ -6090,7 +6090,7 @@
                         <a:buNone/>
                       </a:pPr>
                       <a:r>
-                        <a:rPr sz="1000">
+                        <a:rPr sz="1200">
                           <a:solidFill>
                             <a:srgbClr val="000000">
                               <a:alpha val="100000"/>
@@ -6145,7 +6145,7 @@
                         <a:buNone/>
                       </a:pPr>
                       <a:r>
-                        <a:rPr sz="1000">
+                        <a:rPr sz="1200">
                           <a:solidFill>
                             <a:srgbClr val="000000">
                               <a:alpha val="100000"/>
@@ -6186,7 +6186,7 @@
                   </a:tcPr>
                 </a:tc>
               </a:tr>
-              <a:tr h="252042">
+              <a:tr h="228600">
                 <a:tc>
                   <a:txBody>
                     <a:bodyPr/>
@@ -6202,7 +6202,7 @@
                         <a:buNone/>
                       </a:pPr>
                       <a:r>
-                        <a:rPr sz="1000">
+                        <a:rPr sz="1200">
                           <a:solidFill>
                             <a:srgbClr val="000000">
                               <a:alpha val="100000"/>
@@ -6257,7 +6257,7 @@
                         <a:buNone/>
                       </a:pPr>
                       <a:r>
-                        <a:rPr sz="1000">
+                        <a:rPr sz="1200">
                           <a:solidFill>
                             <a:srgbClr val="000000">
                               <a:alpha val="100000"/>
@@ -6312,7 +6312,7 @@
                         <a:buNone/>
                       </a:pPr>
                       <a:r>
-                        <a:rPr sz="1000">
+                        <a:rPr sz="1200">
                           <a:solidFill>
                             <a:srgbClr val="000000">
                               <a:alpha val="100000"/>
@@ -6367,7 +6367,7 @@
                         <a:buNone/>
                       </a:pPr>
                       <a:r>
-                        <a:rPr sz="1000">
+                        <a:rPr sz="1200">
                           <a:solidFill>
                             <a:srgbClr val="000000">
                               <a:alpha val="100000"/>
@@ -6422,7 +6422,7 @@
                         <a:buNone/>
                       </a:pPr>
                       <a:r>
-                        <a:rPr sz="1000">
+                        <a:rPr sz="1200">
                           <a:solidFill>
                             <a:srgbClr val="000000">
                               <a:alpha val="100000"/>
@@ -6477,7 +6477,7 @@
                         <a:buNone/>
                       </a:pPr>
                       <a:r>
-                        <a:rPr sz="1000">
+                        <a:rPr sz="1200">
                           <a:solidFill>
                             <a:srgbClr val="000000">
                               <a:alpha val="100000"/>
@@ -6532,7 +6532,7 @@
                         <a:buNone/>
                       </a:pPr>
                       <a:r>
-                        <a:rPr sz="1000">
+                        <a:rPr sz="1200">
                           <a:solidFill>
                             <a:srgbClr val="000000">
                               <a:alpha val="100000"/>
@@ -6587,7 +6587,7 @@
                         <a:buNone/>
                       </a:pPr>
                       <a:r>
-                        <a:rPr sz="1000">
+                        <a:rPr sz="1200">
                           <a:solidFill>
                             <a:srgbClr val="000000">
                               <a:alpha val="100000"/>
@@ -6628,7 +6628,7 @@
                   </a:tcPr>
                 </a:tc>
               </a:tr>
-              <a:tr h="252042">
+              <a:tr h="228600">
                 <a:tc>
                   <a:txBody>
                     <a:bodyPr/>
@@ -6644,7 +6644,7 @@
                         <a:buNone/>
                       </a:pPr>
                       <a:r>
-                        <a:rPr sz="1000">
+                        <a:rPr sz="1200">
                           <a:solidFill>
                             <a:srgbClr val="000000">
                               <a:alpha val="100000"/>
@@ -6695,7 +6695,7 @@
                         <a:buNone/>
                       </a:pPr>
                       <a:r>
-                        <a:rPr sz="1000">
+                        <a:rPr sz="1200">
                           <a:solidFill>
                             <a:srgbClr val="000000">
                               <a:alpha val="100000"/>
@@ -6746,7 +6746,7 @@
                         <a:buNone/>
                       </a:pPr>
                       <a:r>
-                        <a:rPr sz="1000">
+                        <a:rPr sz="1200">
                           <a:solidFill>
                             <a:srgbClr val="000000">
                               <a:alpha val="100000"/>
@@ -6797,7 +6797,7 @@
                         <a:buNone/>
                       </a:pPr>
                       <a:r>
-                        <a:rPr sz="1000">
+                        <a:rPr sz="1200">
                           <a:solidFill>
                             <a:srgbClr val="000000">
                               <a:alpha val="100000"/>
@@ -6848,7 +6848,7 @@
                         <a:buNone/>
                       </a:pPr>
                       <a:r>
-                        <a:rPr sz="1000">
+                        <a:rPr sz="1200">
                           <a:solidFill>
                             <a:srgbClr val="000000">
                               <a:alpha val="100000"/>
@@ -6899,7 +6899,7 @@
                         <a:buNone/>
                       </a:pPr>
                       <a:r>
-                        <a:rPr sz="1000">
+                        <a:rPr sz="1200">
                           <a:solidFill>
                             <a:srgbClr val="000000">
                               <a:alpha val="100000"/>
@@ -6950,7 +6950,7 @@
                         <a:buNone/>
                       </a:pPr>
                       <a:r>
-                        <a:rPr sz="1000">
+                        <a:rPr sz="1200">
                           <a:solidFill>
                             <a:srgbClr val="000000">
                               <a:alpha val="100000"/>
@@ -7001,7 +7001,7 @@
                         <a:buNone/>
                       </a:pPr>
                       <a:r>
-                        <a:rPr sz="1000">
+                        <a:rPr sz="1200">
                           <a:solidFill>
                             <a:srgbClr val="000000">
                               <a:alpha val="100000"/>

</xml_diff>